<commit_message>
initial round of changes
</commit_message>
<xml_diff>
--- a/docs/images/sponsors.pptx
+++ b/docs/images/sponsors.pptx
@@ -259,7 +259,7 @@
           <a:p>
             <a:fld id="{0231A3BF-02FE-42AD-9563-0DE589E5EF61}" type="datetimeFigureOut">
               <a:rPr lang="en-US" smtClean="0"/>
-              <a:t>3/23/23</a:t>
+              <a:t>11/13/23</a:t>
             </a:fld>
             <a:endParaRPr lang="en-US"/>
           </a:p>
@@ -457,7 +457,7 @@
           <a:p>
             <a:fld id="{0231A3BF-02FE-42AD-9563-0DE589E5EF61}" type="datetimeFigureOut">
               <a:rPr lang="en-US" smtClean="0"/>
-              <a:t>3/23/23</a:t>
+              <a:t>11/13/23</a:t>
             </a:fld>
             <a:endParaRPr lang="en-US"/>
           </a:p>
@@ -665,7 +665,7 @@
           <a:p>
             <a:fld id="{0231A3BF-02FE-42AD-9563-0DE589E5EF61}" type="datetimeFigureOut">
               <a:rPr lang="en-US" smtClean="0"/>
-              <a:t>3/23/23</a:t>
+              <a:t>11/13/23</a:t>
             </a:fld>
             <a:endParaRPr lang="en-US"/>
           </a:p>
@@ -863,7 +863,7 @@
           <a:p>
             <a:fld id="{0231A3BF-02FE-42AD-9563-0DE589E5EF61}" type="datetimeFigureOut">
               <a:rPr lang="en-US" smtClean="0"/>
-              <a:t>3/23/23</a:t>
+              <a:t>11/13/23</a:t>
             </a:fld>
             <a:endParaRPr lang="en-US"/>
           </a:p>
@@ -1138,7 +1138,7 @@
           <a:p>
             <a:fld id="{0231A3BF-02FE-42AD-9563-0DE589E5EF61}" type="datetimeFigureOut">
               <a:rPr lang="en-US" smtClean="0"/>
-              <a:t>3/23/23</a:t>
+              <a:t>11/13/23</a:t>
             </a:fld>
             <a:endParaRPr lang="en-US"/>
           </a:p>
@@ -1403,7 +1403,7 @@
           <a:p>
             <a:fld id="{0231A3BF-02FE-42AD-9563-0DE589E5EF61}" type="datetimeFigureOut">
               <a:rPr lang="en-US" smtClean="0"/>
-              <a:t>3/23/23</a:t>
+              <a:t>11/13/23</a:t>
             </a:fld>
             <a:endParaRPr lang="en-US"/>
           </a:p>
@@ -1815,7 +1815,7 @@
           <a:p>
             <a:fld id="{0231A3BF-02FE-42AD-9563-0DE589E5EF61}" type="datetimeFigureOut">
               <a:rPr lang="en-US" smtClean="0"/>
-              <a:t>3/23/23</a:t>
+              <a:t>11/13/23</a:t>
             </a:fld>
             <a:endParaRPr lang="en-US"/>
           </a:p>
@@ -1956,7 +1956,7 @@
           <a:p>
             <a:fld id="{0231A3BF-02FE-42AD-9563-0DE589E5EF61}" type="datetimeFigureOut">
               <a:rPr lang="en-US" smtClean="0"/>
-              <a:t>3/23/23</a:t>
+              <a:t>11/13/23</a:t>
             </a:fld>
             <a:endParaRPr lang="en-US"/>
           </a:p>
@@ -2069,7 +2069,7 @@
           <a:p>
             <a:fld id="{0231A3BF-02FE-42AD-9563-0DE589E5EF61}" type="datetimeFigureOut">
               <a:rPr lang="en-US" smtClean="0"/>
-              <a:t>3/23/23</a:t>
+              <a:t>11/13/23</a:t>
             </a:fld>
             <a:endParaRPr lang="en-US"/>
           </a:p>
@@ -2380,7 +2380,7 @@
           <a:p>
             <a:fld id="{0231A3BF-02FE-42AD-9563-0DE589E5EF61}" type="datetimeFigureOut">
               <a:rPr lang="en-US" smtClean="0"/>
-              <a:t>3/23/23</a:t>
+              <a:t>11/13/23</a:t>
             </a:fld>
             <a:endParaRPr lang="en-US"/>
           </a:p>
@@ -2668,7 +2668,7 @@
           <a:p>
             <a:fld id="{0231A3BF-02FE-42AD-9563-0DE589E5EF61}" type="datetimeFigureOut">
               <a:rPr lang="en-US" smtClean="0"/>
-              <a:t>3/23/23</a:t>
+              <a:t>11/13/23</a:t>
             </a:fld>
             <a:endParaRPr lang="en-US"/>
           </a:p>
@@ -2909,7 +2909,7 @@
           <a:p>
             <a:fld id="{0231A3BF-02FE-42AD-9563-0DE589E5EF61}" type="datetimeFigureOut">
               <a:rPr lang="en-US" smtClean="0"/>
-              <a:t>3/23/23</a:t>
+              <a:t>11/13/23</a:t>
             </a:fld>
             <a:endParaRPr lang="en-US"/>
           </a:p>
@@ -3671,78 +3671,6 @@
       </p:pic>
       <p:pic>
         <p:nvPicPr>
-          <p:cNvPr id="8" name="Picture 7" descr="Logo&#10;&#10;Description automatically generated">
-            <a:extLst>
-              <a:ext uri="{FF2B5EF4-FFF2-40B4-BE49-F238E27FC236}">
-                <a16:creationId xmlns:a16="http://schemas.microsoft.com/office/drawing/2014/main" id="{BBFA0F11-8252-C24E-4C2E-2E3B28EB628C}"/>
-              </a:ext>
-            </a:extLst>
-          </p:cNvPr>
-          <p:cNvPicPr>
-            <a:picLocks noChangeAspect="1"/>
-          </p:cNvPicPr>
-          <p:nvPr/>
-        </p:nvPicPr>
-        <p:blipFill>
-          <a:blip r:embed="rId10">
-            <a:extLst>
-              <a:ext uri="{28A0092B-C50C-407E-A947-70E740481C1C}">
-                <a14:useLocalDpi xmlns:a14="http://schemas.microsoft.com/office/drawing/2010/main" val="0"/>
-              </a:ext>
-            </a:extLst>
-          </a:blip>
-          <a:stretch>
-            <a:fillRect/>
-          </a:stretch>
-        </p:blipFill>
-        <p:spPr>
-          <a:xfrm>
-            <a:off x="2387530" y="2661939"/>
-            <a:ext cx="4815255" cy="1934817"/>
-          </a:xfrm>
-          <a:prstGeom prst="rect">
-            <a:avLst/>
-          </a:prstGeom>
-        </p:spPr>
-      </p:pic>
-      <p:pic>
-        <p:nvPicPr>
-          <p:cNvPr id="6" name="Picture 5" descr="Logo&#10;&#10;Description automatically generated">
-            <a:extLst>
-              <a:ext uri="{FF2B5EF4-FFF2-40B4-BE49-F238E27FC236}">
-                <a16:creationId xmlns:a16="http://schemas.microsoft.com/office/drawing/2014/main" id="{75404B2A-7190-02E0-89D5-F8CC0FC26F1D}"/>
-              </a:ext>
-            </a:extLst>
-          </p:cNvPr>
-          <p:cNvPicPr>
-            <a:picLocks noChangeAspect="1"/>
-          </p:cNvPicPr>
-          <p:nvPr/>
-        </p:nvPicPr>
-        <p:blipFill>
-          <a:blip r:embed="rId11">
-            <a:extLst>
-              <a:ext uri="{28A0092B-C50C-407E-A947-70E740481C1C}">
-                <a14:useLocalDpi xmlns:a14="http://schemas.microsoft.com/office/drawing/2010/main" val="0"/>
-              </a:ext>
-            </a:extLst>
-          </a:blip>
-          <a:stretch>
-            <a:fillRect/>
-          </a:stretch>
-        </p:blipFill>
-        <p:spPr>
-          <a:xfrm>
-            <a:off x="7067293" y="2032495"/>
-            <a:ext cx="3015160" cy="3015160"/>
-          </a:xfrm>
-          <a:prstGeom prst="rect">
-            <a:avLst/>
-          </a:prstGeom>
-        </p:spPr>
-      </p:pic>
-      <p:pic>
-        <p:nvPicPr>
           <p:cNvPr id="10" name="Picture 2" descr="Administración de Parques Nacionales - Wikipedia">
             <a:extLst>
               <a:ext uri="{FF2B5EF4-FFF2-40B4-BE49-F238E27FC236}">
@@ -3756,7 +3684,7 @@
           <p:nvPr/>
         </p:nvPicPr>
         <p:blipFill>
-          <a:blip r:embed="rId12">
+          <a:blip r:embed="rId10">
             <a:extLst>
               <a:ext uri="{28A0092B-C50C-407E-A947-70E740481C1C}">
                 <a14:useLocalDpi xmlns:a14="http://schemas.microsoft.com/office/drawing/2010/main" val="0"/>
@@ -3786,6 +3714,114 @@
               </a14:hiddenFill>
             </a:ext>
           </a:extLst>
+        </p:spPr>
+      </p:pic>
+      <p:pic>
+        <p:nvPicPr>
+          <p:cNvPr id="12" name="Picture 11">
+            <a:extLst>
+              <a:ext uri="{FF2B5EF4-FFF2-40B4-BE49-F238E27FC236}">
+                <a16:creationId xmlns:a16="http://schemas.microsoft.com/office/drawing/2014/main" id="{21E7A858-5E20-372C-D133-14B3AB18BBE5}"/>
+              </a:ext>
+            </a:extLst>
+          </p:cNvPr>
+          <p:cNvPicPr>
+            <a:picLocks noChangeAspect="1"/>
+          </p:cNvPicPr>
+          <p:nvPr/>
+        </p:nvPicPr>
+        <p:blipFill>
+          <a:blip r:embed="rId11">
+            <a:extLst>
+              <a:ext uri="{28A0092B-C50C-407E-A947-70E740481C1C}">
+                <a14:useLocalDpi xmlns:a14="http://schemas.microsoft.com/office/drawing/2010/main" val="0"/>
+              </a:ext>
+            </a:extLst>
+          </a:blip>
+          <a:stretch>
+            <a:fillRect/>
+          </a:stretch>
+        </p:blipFill>
+        <p:spPr>
+          <a:xfrm>
+            <a:off x="5616230" y="2872293"/>
+            <a:ext cx="3806481" cy="1113413"/>
+          </a:xfrm>
+          <a:prstGeom prst="rect">
+            <a:avLst/>
+          </a:prstGeom>
+        </p:spPr>
+      </p:pic>
+      <p:pic>
+        <p:nvPicPr>
+          <p:cNvPr id="14" name="Picture 13">
+            <a:extLst>
+              <a:ext uri="{FF2B5EF4-FFF2-40B4-BE49-F238E27FC236}">
+                <a16:creationId xmlns:a16="http://schemas.microsoft.com/office/drawing/2014/main" id="{38E06588-89F2-EBC9-5549-81D771C09BAF}"/>
+              </a:ext>
+            </a:extLst>
+          </p:cNvPr>
+          <p:cNvPicPr>
+            <a:picLocks noChangeAspect="1"/>
+          </p:cNvPicPr>
+          <p:nvPr/>
+        </p:nvPicPr>
+        <p:blipFill>
+          <a:blip r:embed="rId12">
+            <a:extLst>
+              <a:ext uri="{28A0092B-C50C-407E-A947-70E740481C1C}">
+                <a14:useLocalDpi xmlns:a14="http://schemas.microsoft.com/office/drawing/2010/main" val="0"/>
+              </a:ext>
+            </a:extLst>
+          </a:blip>
+          <a:stretch>
+            <a:fillRect/>
+          </a:stretch>
+        </p:blipFill>
+        <p:spPr>
+          <a:xfrm>
+            <a:off x="2862309" y="3670477"/>
+            <a:ext cx="2989647" cy="1224925"/>
+          </a:xfrm>
+          <a:prstGeom prst="rect">
+            <a:avLst/>
+          </a:prstGeom>
+        </p:spPr>
+      </p:pic>
+      <p:pic>
+        <p:nvPicPr>
+          <p:cNvPr id="16" name="Picture 15">
+            <a:extLst>
+              <a:ext uri="{FF2B5EF4-FFF2-40B4-BE49-F238E27FC236}">
+                <a16:creationId xmlns:a16="http://schemas.microsoft.com/office/drawing/2014/main" id="{78E56EF0-BAB5-8D8E-3721-E046A8B9F495}"/>
+              </a:ext>
+            </a:extLst>
+          </p:cNvPr>
+          <p:cNvPicPr>
+            <a:picLocks noChangeAspect="1"/>
+          </p:cNvPicPr>
+          <p:nvPr/>
+        </p:nvPicPr>
+        <p:blipFill>
+          <a:blip r:embed="rId13">
+            <a:extLst>
+              <a:ext uri="{28A0092B-C50C-407E-A947-70E740481C1C}">
+                <a14:useLocalDpi xmlns:a14="http://schemas.microsoft.com/office/drawing/2010/main" val="0"/>
+              </a:ext>
+            </a:extLst>
+          </a:blip>
+          <a:stretch>
+            <a:fillRect/>
+          </a:stretch>
+        </p:blipFill>
+        <p:spPr>
+          <a:xfrm>
+            <a:off x="2862309" y="2348059"/>
+            <a:ext cx="2460893" cy="922835"/>
+          </a:xfrm>
+          <a:prstGeom prst="rect">
+            <a:avLst/>
+          </a:prstGeom>
         </p:spPr>
       </p:pic>
     </p:spTree>

</xml_diff>

<commit_message>
added and modified content to all pages
</commit_message>
<xml_diff>
--- a/docs/images/sponsors.pptx
+++ b/docs/images/sponsors.pptx
@@ -259,7 +259,7 @@
           <a:p>
             <a:fld id="{0231A3BF-02FE-42AD-9563-0DE589E5EF61}" type="datetimeFigureOut">
               <a:rPr lang="en-US" smtClean="0"/>
-              <a:t>11/13/23</a:t>
+              <a:t>11/15/23</a:t>
             </a:fld>
             <a:endParaRPr lang="en-US"/>
           </a:p>
@@ -457,7 +457,7 @@
           <a:p>
             <a:fld id="{0231A3BF-02FE-42AD-9563-0DE589E5EF61}" type="datetimeFigureOut">
               <a:rPr lang="en-US" smtClean="0"/>
-              <a:t>11/13/23</a:t>
+              <a:t>11/15/23</a:t>
             </a:fld>
             <a:endParaRPr lang="en-US"/>
           </a:p>
@@ -665,7 +665,7 @@
           <a:p>
             <a:fld id="{0231A3BF-02FE-42AD-9563-0DE589E5EF61}" type="datetimeFigureOut">
               <a:rPr lang="en-US" smtClean="0"/>
-              <a:t>11/13/23</a:t>
+              <a:t>11/15/23</a:t>
             </a:fld>
             <a:endParaRPr lang="en-US"/>
           </a:p>
@@ -863,7 +863,7 @@
           <a:p>
             <a:fld id="{0231A3BF-02FE-42AD-9563-0DE589E5EF61}" type="datetimeFigureOut">
               <a:rPr lang="en-US" smtClean="0"/>
-              <a:t>11/13/23</a:t>
+              <a:t>11/15/23</a:t>
             </a:fld>
             <a:endParaRPr lang="en-US"/>
           </a:p>
@@ -1138,7 +1138,7 @@
           <a:p>
             <a:fld id="{0231A3BF-02FE-42AD-9563-0DE589E5EF61}" type="datetimeFigureOut">
               <a:rPr lang="en-US" smtClean="0"/>
-              <a:t>11/13/23</a:t>
+              <a:t>11/15/23</a:t>
             </a:fld>
             <a:endParaRPr lang="en-US"/>
           </a:p>
@@ -1403,7 +1403,7 @@
           <a:p>
             <a:fld id="{0231A3BF-02FE-42AD-9563-0DE589E5EF61}" type="datetimeFigureOut">
               <a:rPr lang="en-US" smtClean="0"/>
-              <a:t>11/13/23</a:t>
+              <a:t>11/15/23</a:t>
             </a:fld>
             <a:endParaRPr lang="en-US"/>
           </a:p>
@@ -1815,7 +1815,7 @@
           <a:p>
             <a:fld id="{0231A3BF-02FE-42AD-9563-0DE589E5EF61}" type="datetimeFigureOut">
               <a:rPr lang="en-US" smtClean="0"/>
-              <a:t>11/13/23</a:t>
+              <a:t>11/15/23</a:t>
             </a:fld>
             <a:endParaRPr lang="en-US"/>
           </a:p>
@@ -1956,7 +1956,7 @@
           <a:p>
             <a:fld id="{0231A3BF-02FE-42AD-9563-0DE589E5EF61}" type="datetimeFigureOut">
               <a:rPr lang="en-US" smtClean="0"/>
-              <a:t>11/13/23</a:t>
+              <a:t>11/15/23</a:t>
             </a:fld>
             <a:endParaRPr lang="en-US"/>
           </a:p>
@@ -2069,7 +2069,7 @@
           <a:p>
             <a:fld id="{0231A3BF-02FE-42AD-9563-0DE589E5EF61}" type="datetimeFigureOut">
               <a:rPr lang="en-US" smtClean="0"/>
-              <a:t>11/13/23</a:t>
+              <a:t>11/15/23</a:t>
             </a:fld>
             <a:endParaRPr lang="en-US"/>
           </a:p>
@@ -2380,7 +2380,7 @@
           <a:p>
             <a:fld id="{0231A3BF-02FE-42AD-9563-0DE589E5EF61}" type="datetimeFigureOut">
               <a:rPr lang="en-US" smtClean="0"/>
-              <a:t>11/13/23</a:t>
+              <a:t>11/15/23</a:t>
             </a:fld>
             <a:endParaRPr lang="en-US"/>
           </a:p>
@@ -2668,7 +2668,7 @@
           <a:p>
             <a:fld id="{0231A3BF-02FE-42AD-9563-0DE589E5EF61}" type="datetimeFigureOut">
               <a:rPr lang="en-US" smtClean="0"/>
-              <a:t>11/13/23</a:t>
+              <a:t>11/15/23</a:t>
             </a:fld>
             <a:endParaRPr lang="en-US"/>
           </a:p>
@@ -2909,7 +2909,7 @@
           <a:p>
             <a:fld id="{0231A3BF-02FE-42AD-9563-0DE589E5EF61}" type="datetimeFigureOut">
               <a:rPr lang="en-US" smtClean="0"/>
-              <a:t>11/13/23</a:t>
+              <a:t>11/15/23</a:t>
             </a:fld>
             <a:endParaRPr lang="en-US"/>
           </a:p>
@@ -3355,8 +3355,8 @@
         </p:blipFill>
         <p:spPr bwMode="auto">
           <a:xfrm>
-            <a:off x="5137703" y="589881"/>
-            <a:ext cx="2424594" cy="1224925"/>
+            <a:off x="8353789" y="329636"/>
+            <a:ext cx="3045702" cy="1538714"/>
           </a:xfrm>
           <a:prstGeom prst="rect">
             <a:avLst/>
@@ -3532,8 +3532,8 @@
         </p:blipFill>
         <p:spPr bwMode="auto">
           <a:xfrm>
-            <a:off x="9946961" y="2661939"/>
-            <a:ext cx="2013844" cy="2004893"/>
+            <a:off x="9328619" y="2042626"/>
+            <a:ext cx="2355897" cy="2345426"/>
           </a:xfrm>
           <a:prstGeom prst="rect">
             <a:avLst/>
@@ -3635,42 +3635,6 @@
       </p:pic>
       <p:pic>
         <p:nvPicPr>
-          <p:cNvPr id="5" name="Picture 4" descr="Logo&#10;&#10;Description automatically generated">
-            <a:extLst>
-              <a:ext uri="{FF2B5EF4-FFF2-40B4-BE49-F238E27FC236}">
-                <a16:creationId xmlns:a16="http://schemas.microsoft.com/office/drawing/2014/main" id="{A163CB0F-BBEA-C17F-113D-2D88713930FE}"/>
-              </a:ext>
-            </a:extLst>
-          </p:cNvPr>
-          <p:cNvPicPr>
-            <a:picLocks noChangeAspect="1"/>
-          </p:cNvPicPr>
-          <p:nvPr/>
-        </p:nvPicPr>
-        <p:blipFill>
-          <a:blip r:embed="rId9">
-            <a:extLst>
-              <a:ext uri="{28A0092B-C50C-407E-A947-70E740481C1C}">
-                <a14:useLocalDpi xmlns:a14="http://schemas.microsoft.com/office/drawing/2010/main" val="0"/>
-              </a:ext>
-            </a:extLst>
-          </a:blip>
-          <a:stretch>
-            <a:fillRect/>
-          </a:stretch>
-        </p:blipFill>
-        <p:spPr>
-          <a:xfrm>
-            <a:off x="7978487" y="358827"/>
-            <a:ext cx="4213513" cy="1455979"/>
-          </a:xfrm>
-          <a:prstGeom prst="rect">
-            <a:avLst/>
-          </a:prstGeom>
-        </p:spPr>
-      </p:pic>
-      <p:pic>
-        <p:nvPicPr>
           <p:cNvPr id="10" name="Picture 2" descr="Administración de Parques Nacionales - Wikipedia">
             <a:extLst>
               <a:ext uri="{FF2B5EF4-FFF2-40B4-BE49-F238E27FC236}">
@@ -3684,7 +3648,7 @@
           <p:nvPr/>
         </p:nvPicPr>
         <p:blipFill>
-          <a:blip r:embed="rId10">
+          <a:blip r:embed="rId9">
             <a:extLst>
               <a:ext uri="{28A0092B-C50C-407E-A947-70E740481C1C}">
                 <a14:useLocalDpi xmlns:a14="http://schemas.microsoft.com/office/drawing/2010/main" val="0"/>
@@ -3731,7 +3695,7 @@
           <p:nvPr/>
         </p:nvPicPr>
         <p:blipFill>
-          <a:blip r:embed="rId11">
+          <a:blip r:embed="rId10">
             <a:extLst>
               <a:ext uri="{28A0092B-C50C-407E-A947-70E740481C1C}">
                 <a14:useLocalDpi xmlns:a14="http://schemas.microsoft.com/office/drawing/2010/main" val="0"/>
@@ -3744,8 +3708,8 @@
         </p:blipFill>
         <p:spPr>
           <a:xfrm>
-            <a:off x="5616230" y="2872293"/>
-            <a:ext cx="3806481" cy="1113413"/>
+            <a:off x="6338036" y="4328631"/>
+            <a:ext cx="2655713" cy="776808"/>
           </a:xfrm>
           <a:prstGeom prst="rect">
             <a:avLst/>
@@ -3767,7 +3731,7 @@
           <p:nvPr/>
         </p:nvPicPr>
         <p:blipFill>
-          <a:blip r:embed="rId12">
+          <a:blip r:embed="rId11">
             <a:extLst>
               <a:ext uri="{28A0092B-C50C-407E-A947-70E740481C1C}">
                 <a14:useLocalDpi xmlns:a14="http://schemas.microsoft.com/office/drawing/2010/main" val="0"/>
@@ -3803,7 +3767,7 @@
           <p:nvPr/>
         </p:nvPicPr>
         <p:blipFill>
-          <a:blip r:embed="rId13">
+          <a:blip r:embed="rId12">
             <a:extLst>
               <a:ext uri="{28A0092B-C50C-407E-A947-70E740481C1C}">
                 <a14:useLocalDpi xmlns:a14="http://schemas.microsoft.com/office/drawing/2010/main" val="0"/>
@@ -3822,6 +3786,100 @@
           <a:prstGeom prst="rect">
             <a:avLst/>
           </a:prstGeom>
+        </p:spPr>
+      </p:pic>
+      <p:pic>
+        <p:nvPicPr>
+          <p:cNvPr id="1028" name="Picture 4" descr="Organización | IX Jornadas Nacionales de Ciencias del Mar – Ciencia y  Sociedad: integrando saberes en los estudios del Mar">
+            <a:extLst>
+              <a:ext uri="{FF2B5EF4-FFF2-40B4-BE49-F238E27FC236}">
+                <a16:creationId xmlns:a16="http://schemas.microsoft.com/office/drawing/2014/main" id="{DFB2F8E7-83E4-6C5C-77F6-7C9D50BF1CB6}"/>
+              </a:ext>
+            </a:extLst>
+          </p:cNvPr>
+          <p:cNvPicPr>
+            <a:picLocks noChangeAspect="1" noChangeArrowheads="1"/>
+          </p:cNvPicPr>
+          <p:nvPr/>
+        </p:nvPicPr>
+        <p:blipFill>
+          <a:blip r:embed="rId13">
+            <a:extLst>
+              <a:ext uri="{28A0092B-C50C-407E-A947-70E740481C1C}">
+                <a14:useLocalDpi xmlns:a14="http://schemas.microsoft.com/office/drawing/2010/main" val="0"/>
+              </a:ext>
+            </a:extLst>
+          </a:blip>
+          <a:srcRect/>
+          <a:stretch>
+            <a:fillRect/>
+          </a:stretch>
+        </p:blipFill>
+        <p:spPr bwMode="auto">
+          <a:xfrm>
+            <a:off x="5630892" y="485727"/>
+            <a:ext cx="2073935" cy="1382623"/>
+          </a:xfrm>
+          <a:prstGeom prst="rect">
+            <a:avLst/>
+          </a:prstGeom>
+          <a:noFill/>
+          <a:extLst>
+            <a:ext uri="{909E8E84-426E-40DD-AFC4-6F175D3DCCD1}">
+              <a14:hiddenFill xmlns:a14="http://schemas.microsoft.com/office/drawing/2010/main">
+                <a:solidFill>
+                  <a:srgbClr val="FFFFFF"/>
+                </a:solidFill>
+              </a14:hiddenFill>
+            </a:ext>
+          </a:extLst>
+        </p:spPr>
+      </p:pic>
+      <p:pic>
+        <p:nvPicPr>
+          <p:cNvPr id="6" name="Picture 6">
+            <a:extLst>
+              <a:ext uri="{FF2B5EF4-FFF2-40B4-BE49-F238E27FC236}">
+                <a16:creationId xmlns:a16="http://schemas.microsoft.com/office/drawing/2014/main" id="{3773170E-BD89-7D43-183C-6A70242BA1FA}"/>
+              </a:ext>
+            </a:extLst>
+          </p:cNvPr>
+          <p:cNvPicPr>
+            <a:picLocks noChangeAspect="1" noChangeArrowheads="1"/>
+          </p:cNvPicPr>
+          <p:nvPr/>
+        </p:nvPicPr>
+        <p:blipFill>
+          <a:blip r:embed="rId14">
+            <a:extLst>
+              <a:ext uri="{28A0092B-C50C-407E-A947-70E740481C1C}">
+                <a14:useLocalDpi xmlns:a14="http://schemas.microsoft.com/office/drawing/2010/main" val="0"/>
+              </a:ext>
+            </a:extLst>
+          </a:blip>
+          <a:srcRect/>
+          <a:stretch>
+            <a:fillRect/>
+          </a:stretch>
+        </p:blipFill>
+        <p:spPr bwMode="auto">
+          <a:xfrm>
+            <a:off x="6741793" y="2050490"/>
+            <a:ext cx="1989166" cy="1989166"/>
+          </a:xfrm>
+          <a:prstGeom prst="rect">
+            <a:avLst/>
+          </a:prstGeom>
+          <a:noFill/>
+          <a:extLst>
+            <a:ext uri="{909E8E84-426E-40DD-AFC4-6F175D3DCCD1}">
+              <a14:hiddenFill xmlns:a14="http://schemas.microsoft.com/office/drawing/2010/main">
+                <a:solidFill>
+                  <a:srgbClr val="FFFFFF"/>
+                </a:solidFill>
+              </a14:hiddenFill>
+            </a:ext>
+          </a:extLst>
         </p:spPr>
       </p:pic>
     </p:spTree>

</xml_diff>

<commit_message>
replaced logos: cenpat by ibiomar
</commit_message>
<xml_diff>
--- a/docs/images/sponsors.pptx
+++ b/docs/images/sponsors.pptx
@@ -259,7 +259,7 @@
           <a:p>
             <a:fld id="{0231A3BF-02FE-42AD-9563-0DE589E5EF61}" type="datetimeFigureOut">
               <a:rPr lang="en-US" smtClean="0"/>
-              <a:t>11/15/23</a:t>
+              <a:t>11/16/23</a:t>
             </a:fld>
             <a:endParaRPr lang="en-US"/>
           </a:p>
@@ -457,7 +457,7 @@
           <a:p>
             <a:fld id="{0231A3BF-02FE-42AD-9563-0DE589E5EF61}" type="datetimeFigureOut">
               <a:rPr lang="en-US" smtClean="0"/>
-              <a:t>11/15/23</a:t>
+              <a:t>11/16/23</a:t>
             </a:fld>
             <a:endParaRPr lang="en-US"/>
           </a:p>
@@ -665,7 +665,7 @@
           <a:p>
             <a:fld id="{0231A3BF-02FE-42AD-9563-0DE589E5EF61}" type="datetimeFigureOut">
               <a:rPr lang="en-US" smtClean="0"/>
-              <a:t>11/15/23</a:t>
+              <a:t>11/16/23</a:t>
             </a:fld>
             <a:endParaRPr lang="en-US"/>
           </a:p>
@@ -863,7 +863,7 @@
           <a:p>
             <a:fld id="{0231A3BF-02FE-42AD-9563-0DE589E5EF61}" type="datetimeFigureOut">
               <a:rPr lang="en-US" smtClean="0"/>
-              <a:t>11/15/23</a:t>
+              <a:t>11/16/23</a:t>
             </a:fld>
             <a:endParaRPr lang="en-US"/>
           </a:p>
@@ -1138,7 +1138,7 @@
           <a:p>
             <a:fld id="{0231A3BF-02FE-42AD-9563-0DE589E5EF61}" type="datetimeFigureOut">
               <a:rPr lang="en-US" smtClean="0"/>
-              <a:t>11/15/23</a:t>
+              <a:t>11/16/23</a:t>
             </a:fld>
             <a:endParaRPr lang="en-US"/>
           </a:p>
@@ -1403,7 +1403,7 @@
           <a:p>
             <a:fld id="{0231A3BF-02FE-42AD-9563-0DE589E5EF61}" type="datetimeFigureOut">
               <a:rPr lang="en-US" smtClean="0"/>
-              <a:t>11/15/23</a:t>
+              <a:t>11/16/23</a:t>
             </a:fld>
             <a:endParaRPr lang="en-US"/>
           </a:p>
@@ -1815,7 +1815,7 @@
           <a:p>
             <a:fld id="{0231A3BF-02FE-42AD-9563-0DE589E5EF61}" type="datetimeFigureOut">
               <a:rPr lang="en-US" smtClean="0"/>
-              <a:t>11/15/23</a:t>
+              <a:t>11/16/23</a:t>
             </a:fld>
             <a:endParaRPr lang="en-US"/>
           </a:p>
@@ -1956,7 +1956,7 @@
           <a:p>
             <a:fld id="{0231A3BF-02FE-42AD-9563-0DE589E5EF61}" type="datetimeFigureOut">
               <a:rPr lang="en-US" smtClean="0"/>
-              <a:t>11/15/23</a:t>
+              <a:t>11/16/23</a:t>
             </a:fld>
             <a:endParaRPr lang="en-US"/>
           </a:p>
@@ -2069,7 +2069,7 @@
           <a:p>
             <a:fld id="{0231A3BF-02FE-42AD-9563-0DE589E5EF61}" type="datetimeFigureOut">
               <a:rPr lang="en-US" smtClean="0"/>
-              <a:t>11/15/23</a:t>
+              <a:t>11/16/23</a:t>
             </a:fld>
             <a:endParaRPr lang="en-US"/>
           </a:p>
@@ -2380,7 +2380,7 @@
           <a:p>
             <a:fld id="{0231A3BF-02FE-42AD-9563-0DE589E5EF61}" type="datetimeFigureOut">
               <a:rPr lang="en-US" smtClean="0"/>
-              <a:t>11/15/23</a:t>
+              <a:t>11/16/23</a:t>
             </a:fld>
             <a:endParaRPr lang="en-US"/>
           </a:p>
@@ -2668,7 +2668,7 @@
           <a:p>
             <a:fld id="{0231A3BF-02FE-42AD-9563-0DE589E5EF61}" type="datetimeFigureOut">
               <a:rPr lang="en-US" smtClean="0"/>
-              <a:t>11/15/23</a:t>
+              <a:t>11/16/23</a:t>
             </a:fld>
             <a:endParaRPr lang="en-US"/>
           </a:p>
@@ -2909,7 +2909,7 @@
           <a:p>
             <a:fld id="{0231A3BF-02FE-42AD-9563-0DE589E5EF61}" type="datetimeFigureOut">
               <a:rPr lang="en-US" smtClean="0"/>
-              <a:t>11/15/23</a:t>
+              <a:t>11/16/23</a:t>
             </a:fld>
             <a:endParaRPr lang="en-US"/>
           </a:p>
@@ -3552,53 +3552,6 @@
       </p:pic>
       <p:pic>
         <p:nvPicPr>
-          <p:cNvPr id="1036" name="Picture 12">
-            <a:extLst>
-              <a:ext uri="{FF2B5EF4-FFF2-40B4-BE49-F238E27FC236}">
-                <a16:creationId xmlns:a16="http://schemas.microsoft.com/office/drawing/2014/main" id="{B7D87A23-0C31-C76D-4ABE-5D51888F2EA3}"/>
-              </a:ext>
-            </a:extLst>
-          </p:cNvPr>
-          <p:cNvPicPr>
-            <a:picLocks noChangeAspect="1" noChangeArrowheads="1"/>
-          </p:cNvPicPr>
-          <p:nvPr/>
-        </p:nvPicPr>
-        <p:blipFill>
-          <a:blip r:embed="rId7">
-            <a:extLst>
-              <a:ext uri="{28A0092B-C50C-407E-A947-70E740481C1C}">
-                <a14:useLocalDpi xmlns:a14="http://schemas.microsoft.com/office/drawing/2010/main" val="0"/>
-              </a:ext>
-            </a:extLst>
-          </a:blip>
-          <a:srcRect/>
-          <a:stretch>
-            <a:fillRect/>
-          </a:stretch>
-        </p:blipFill>
-        <p:spPr bwMode="auto">
-          <a:xfrm>
-            <a:off x="2370564" y="329636"/>
-            <a:ext cx="2424594" cy="1745417"/>
-          </a:xfrm>
-          <a:prstGeom prst="rect">
-            <a:avLst/>
-          </a:prstGeom>
-          <a:noFill/>
-          <a:extLst>
-            <a:ext uri="{909E8E84-426E-40DD-AFC4-6F175D3DCCD1}">
-              <a14:hiddenFill xmlns:a14="http://schemas.microsoft.com/office/drawing/2010/main">
-                <a:solidFill>
-                  <a:srgbClr val="FFFFFF"/>
-                </a:solidFill>
-              </a14:hiddenFill>
-            </a:ext>
-          </a:extLst>
-        </p:spPr>
-      </p:pic>
-      <p:pic>
-        <p:nvPicPr>
           <p:cNvPr id="7" name="Picture 6">
             <a:extLst>
               <a:ext uri="{FF2B5EF4-FFF2-40B4-BE49-F238E27FC236}">
@@ -3612,7 +3565,7 @@
           <p:nvPr/>
         </p:nvPicPr>
         <p:blipFill>
-          <a:blip r:embed="rId8">
+          <a:blip r:embed="rId7">
             <a:extLst>
               <a:ext uri="{28A0092B-C50C-407E-A947-70E740481C1C}">
                 <a14:useLocalDpi xmlns:a14="http://schemas.microsoft.com/office/drawing/2010/main" val="0"/>
@@ -3648,7 +3601,7 @@
           <p:nvPr/>
         </p:nvPicPr>
         <p:blipFill>
-          <a:blip r:embed="rId9">
+          <a:blip r:embed="rId8">
             <a:extLst>
               <a:ext uri="{28A0092B-C50C-407E-A947-70E740481C1C}">
                 <a14:useLocalDpi xmlns:a14="http://schemas.microsoft.com/office/drawing/2010/main" val="0"/>
@@ -3695,7 +3648,7 @@
           <p:nvPr/>
         </p:nvPicPr>
         <p:blipFill>
-          <a:blip r:embed="rId10">
+          <a:blip r:embed="rId9">
             <a:extLst>
               <a:ext uri="{28A0092B-C50C-407E-A947-70E740481C1C}">
                 <a14:useLocalDpi xmlns:a14="http://schemas.microsoft.com/office/drawing/2010/main" val="0"/>
@@ -3731,7 +3684,7 @@
           <p:nvPr/>
         </p:nvPicPr>
         <p:blipFill>
-          <a:blip r:embed="rId11">
+          <a:blip r:embed="rId10">
             <a:extLst>
               <a:ext uri="{28A0092B-C50C-407E-A947-70E740481C1C}">
                 <a14:useLocalDpi xmlns:a14="http://schemas.microsoft.com/office/drawing/2010/main" val="0"/>
@@ -3767,7 +3720,7 @@
           <p:nvPr/>
         </p:nvPicPr>
         <p:blipFill>
-          <a:blip r:embed="rId12">
+          <a:blip r:embed="rId11">
             <a:extLst>
               <a:ext uri="{28A0092B-C50C-407E-A947-70E740481C1C}">
                 <a14:useLocalDpi xmlns:a14="http://schemas.microsoft.com/office/drawing/2010/main" val="0"/>
@@ -3780,7 +3733,7 @@
         </p:blipFill>
         <p:spPr>
           <a:xfrm>
-            <a:off x="2862309" y="2348059"/>
+            <a:off x="3444313" y="2506165"/>
             <a:ext cx="2460893" cy="922835"/>
           </a:xfrm>
           <a:prstGeom prst="rect">
@@ -3803,7 +3756,7 @@
           <p:nvPr/>
         </p:nvPicPr>
         <p:blipFill>
-          <a:blip r:embed="rId13">
+          <a:blip r:embed="rId12">
             <a:extLst>
               <a:ext uri="{28A0092B-C50C-407E-A947-70E740481C1C}">
                 <a14:useLocalDpi xmlns:a14="http://schemas.microsoft.com/office/drawing/2010/main" val="0"/>
@@ -3850,7 +3803,7 @@
           <p:nvPr/>
         </p:nvPicPr>
         <p:blipFill>
-          <a:blip r:embed="rId14">
+          <a:blip r:embed="rId13">
             <a:extLst>
               <a:ext uri="{28A0092B-C50C-407E-A947-70E740481C1C}">
                 <a14:useLocalDpi xmlns:a14="http://schemas.microsoft.com/office/drawing/2010/main" val="0"/>
@@ -3880,6 +3833,42 @@
               </a14:hiddenFill>
             </a:ext>
           </a:extLst>
+        </p:spPr>
+      </p:pic>
+      <p:pic>
+        <p:nvPicPr>
+          <p:cNvPr id="5" name="Picture 4">
+            <a:extLst>
+              <a:ext uri="{FF2B5EF4-FFF2-40B4-BE49-F238E27FC236}">
+                <a16:creationId xmlns:a16="http://schemas.microsoft.com/office/drawing/2014/main" id="{03D25547-5255-3E42-80CE-FC44E5CCB695}"/>
+              </a:ext>
+            </a:extLst>
+          </p:cNvPr>
+          <p:cNvPicPr>
+            <a:picLocks noChangeAspect="1"/>
+          </p:cNvPicPr>
+          <p:nvPr/>
+        </p:nvPicPr>
+        <p:blipFill>
+          <a:blip r:embed="rId14">
+            <a:extLst>
+              <a:ext uri="{28A0092B-C50C-407E-A947-70E740481C1C}">
+                <a14:useLocalDpi xmlns:a14="http://schemas.microsoft.com/office/drawing/2010/main" val="0"/>
+              </a:ext>
+            </a:extLst>
+          </a:blip>
+          <a:stretch>
+            <a:fillRect/>
+          </a:stretch>
+        </p:blipFill>
+        <p:spPr>
+          <a:xfrm>
+            <a:off x="2733738" y="349089"/>
+            <a:ext cx="2208947" cy="1893383"/>
+          </a:xfrm>
+          <a:prstGeom prst="rect">
+            <a:avLst/>
+          </a:prstGeom>
         </p:spPr>
       </p:pic>
     </p:spTree>

</xml_diff>